<commit_message>
uploaded last version of docs
</commit_message>
<xml_diff>
--- a/docs/slides.pptx
+++ b/docs/slides.pptx
@@ -222,7 +222,7 @@
           <a:p>
             <a:fld id="{96F96AA7-27DB-4796-950F-01EE16CC1980}" type="datetimeFigureOut">
               <a:rPr lang="it-IT" smtClean="0"/>
-              <a:t>01/05/2020</a:t>
+              <a:t>03/05/2020</a:t>
             </a:fld>
             <a:endParaRPr lang="it-IT"/>
           </a:p>
@@ -400,7 +400,7 @@
           <a:p>
             <a:fld id="{BDC6AB23-396B-450A-9BE4-A3EEAA036872}" type="datetimeFigureOut">
               <a:rPr lang="it-IT" smtClean="0"/>
-              <a:t>01/05/2020</a:t>
+              <a:t>03/05/2020</a:t>
             </a:fld>
             <a:endParaRPr lang="it-IT"/>
           </a:p>
@@ -894,7 +894,7 @@
           <a:p>
             <a:fld id="{07528FCD-9B10-4DA9-AB6C-13A07661A608}" type="datetime1">
               <a:rPr lang="en-US" smtClean="0"/>
-              <a:t>5/1/2020</a:t>
+              <a:t>5/3/2020</a:t>
             </a:fld>
             <a:endParaRPr lang="en-US"/>
           </a:p>
@@ -1105,7 +1105,7 @@
           <a:p>
             <a:fld id="{D04A13A4-4AED-45C4-B311-0E67E77E6796}" type="datetime1">
               <a:rPr lang="en-US" smtClean="0"/>
-              <a:t>5/1/2020</a:t>
+              <a:t>5/3/2020</a:t>
             </a:fld>
             <a:endParaRPr lang="en-US"/>
           </a:p>
@@ -1364,7 +1364,7 @@
           <a:p>
             <a:fld id="{B05639F8-6E89-4FCD-ACAC-DBB255D3BE48}" type="datetime1">
               <a:rPr lang="en-US" smtClean="0"/>
-              <a:t>5/1/2020</a:t>
+              <a:t>5/3/2020</a:t>
             </a:fld>
             <a:endParaRPr lang="en-US"/>
           </a:p>
@@ -1537,7 +1537,7 @@
           <a:p>
             <a:fld id="{13E1C933-8916-427B-807F-25C9E5524323}" type="datetime1">
               <a:rPr lang="en-US" smtClean="0"/>
-              <a:t>5/1/2020</a:t>
+              <a:t>5/3/2020</a:t>
             </a:fld>
             <a:endParaRPr lang="en-US"/>
           </a:p>
@@ -1883,7 +1883,7 @@
           <a:p>
             <a:fld id="{0E2749EF-0B86-4E11-B733-42FCB71C72B9}" type="datetime1">
               <a:rPr lang="en-US" smtClean="0"/>
-              <a:t>5/1/2020</a:t>
+              <a:t>5/3/2020</a:t>
             </a:fld>
             <a:endParaRPr lang="en-US"/>
           </a:p>
@@ -2161,7 +2161,7 @@
           <a:p>
             <a:fld id="{2D2770F7-4B9B-429E-A557-F407B822EA32}" type="datetime1">
               <a:rPr lang="en-US" smtClean="0"/>
-              <a:t>5/1/2020</a:t>
+              <a:t>5/3/2020</a:t>
             </a:fld>
             <a:endParaRPr lang="en-US"/>
           </a:p>
@@ -2548,7 +2548,7 @@
           <a:p>
             <a:fld id="{9CA34D3E-183D-4B19-8F51-B7051437761D}" type="datetime1">
               <a:rPr lang="en-US" smtClean="0"/>
-              <a:t>5/1/2020</a:t>
+              <a:t>5/3/2020</a:t>
             </a:fld>
             <a:endParaRPr lang="en-US"/>
           </a:p>
@@ -2669,7 +2669,7 @@
           <a:p>
             <a:fld id="{9CEDD398-A44D-422A-A637-20A5ED16A8E0}" type="datetime1">
               <a:rPr lang="en-US" smtClean="0"/>
-              <a:t>5/1/2020</a:t>
+              <a:t>5/3/2020</a:t>
             </a:fld>
             <a:endParaRPr lang="en-US"/>
           </a:p>
@@ -2843,7 +2843,7 @@
           <a:p>
             <a:fld id="{3FD718DE-18F0-4B20-9197-C3D68D0DAC93}" type="datetime1">
               <a:rPr lang="en-US" smtClean="0"/>
-              <a:t>5/1/2020</a:t>
+              <a:t>5/3/2020</a:t>
             </a:fld>
             <a:endParaRPr lang="en-US"/>
           </a:p>
@@ -3200,7 +3200,7 @@
           <a:p>
             <a:fld id="{2F0AE23D-F30A-4687-9D23-E8E9D049FF08}" type="datetime1">
               <a:rPr lang="en-US" smtClean="0"/>
-              <a:t>5/1/2020</a:t>
+              <a:t>5/3/2020</a:t>
             </a:fld>
             <a:endParaRPr lang="en-US"/>
           </a:p>
@@ -3585,7 +3585,7 @@
           <a:p>
             <a:fld id="{AE7F8028-9155-47AE-9B46-671BE77A582F}" type="datetime1">
               <a:rPr lang="en-US" smtClean="0"/>
-              <a:t>5/1/2020</a:t>
+              <a:t>5/3/2020</a:t>
             </a:fld>
             <a:endParaRPr lang="en-US"/>
           </a:p>
@@ -3876,7 +3876,7 @@
           <a:p>
             <a:fld id="{45EAF5C3-6944-4EAB-8201-409AE3FFEB8F}" type="datetime1">
               <a:rPr lang="en-US" smtClean="0"/>
-              <a:t>5/1/2020</a:t>
+              <a:t>5/3/2020</a:t>
             </a:fld>
             <a:endParaRPr lang="en-US"/>
           </a:p>
@@ -4636,7 +4636,7 @@
             </a:r>
             <a:r>
               <a:rPr lang="en-US" dirty="0"/>
-              <a:t>: let the user to select a year between 2000 and 2019. Also he can check button for the comparison mode.</a:t>
+              <a:t>: let the user to select a year between 2000 and 2020. Also he can check button for the comparison mode.</a:t>
             </a:r>
             <a:endParaRPr lang="en-US" b="1" dirty="0"/>
           </a:p>
@@ -4673,7 +4673,7 @@
             </a:r>
             <a:r>
               <a:rPr lang="en-US" dirty="0"/>
-              <a:t>: let the user to brush an area to focus on only part of data. Doing this, the parallel coordinates plot and the map will change their data color to point out which are the ones just selected with scatterplot.</a:t>
+              <a:t>: let the user to brush an area to focus on only part of data. Doing this, the parallel chart and the map will change their data color to point out which are the ones just selected with scatterplot.</a:t>
             </a:r>
           </a:p>
           <a:p>
@@ -4687,11 +4687,11 @@
             </a:r>
             <a:r>
               <a:rPr lang="en-US" b="1" dirty="0"/>
-              <a:t>Parallel coordinates plot</a:t>
+              <a:t>Parallel</a:t>
             </a:r>
             <a:r>
               <a:rPr lang="en-US" dirty="0"/>
-              <a:t>: it offers possibility to filter out data based on different feature of the dataset to focus on specific range of values. Doing this, all other graphs update their data according to the selected range of value. So, what emerges is also a bidirectional interaction between it and map and another one with it and scatterplot.</a:t>
+              <a:t>: it offers possibility to filter out data based on different feature of the dataset to focus on specific range of values. Doing this, all other graphs update their data according to the selected range of value. So, what emerges is also a bidirectional interaction between parallel and map and another one with parallel and scatterplot.</a:t>
             </a:r>
           </a:p>
           <a:p>
@@ -4737,7 +4737,7 @@
           <a:p>
             <a:fld id="{240AD565-08AA-4592-89E3-645390B44F24}" type="datetime1">
               <a:rPr lang="en-US" sz="1200" smtClean="0"/>
-              <a:t>5/1/2020</a:t>
+              <a:t>5/3/2020</a:t>
             </a:fld>
             <a:endParaRPr lang="en-US" sz="1200"/>
           </a:p>
@@ -4944,27 +4944,19 @@
               <a:t> </a:t>
             </a:r>
             <a:r>
-              <a:rPr lang="it-IT" b="1" dirty="0" err="1">
-                <a:solidFill>
-                  <a:schemeClr val="tx1"/>
-                </a:solidFill>
-              </a:rPr>
+              <a:rPr lang="it-IT" dirty="0" err="1"/>
               <a:t>computation</a:t>
             </a:r>
             <a:r>
-              <a:rPr lang="it-IT" b="1" dirty="0"/>
+              <a:rPr lang="it-IT" dirty="0"/>
               <a:t> </a:t>
             </a:r>
             <a:r>
-              <a:rPr lang="it-IT" b="1" dirty="0" err="1">
-                <a:solidFill>
-                  <a:schemeClr val="tx1"/>
-                </a:solidFill>
-              </a:rPr>
+              <a:rPr lang="it-IT" dirty="0" err="1"/>
               <a:t>efforts</a:t>
             </a:r>
             <a:r>
-              <a:rPr lang="it-IT" b="1" dirty="0"/>
+              <a:rPr lang="it-IT" dirty="0"/>
               <a:t> </a:t>
             </a:r>
             <a:r>
@@ -5031,19 +5023,7 @@
             </a:r>
             <a:r>
               <a:rPr lang="it-IT" dirty="0"/>
-              <a:t> of the </a:t>
-            </a:r>
-            <a:r>
-              <a:rPr lang="it-IT" b="1" dirty="0">
-                <a:solidFill>
-                  <a:schemeClr val="tx1"/>
-                </a:solidFill>
-              </a:rPr>
-              <a:t>frequencies</a:t>
-            </a:r>
-            <a:r>
-              <a:rPr lang="it-IT" dirty="0"/>
-              <a:t>, </a:t>
+              <a:t> of the frequencies, </a:t>
             </a:r>
             <a:r>
               <a:rPr lang="it-IT" dirty="0" err="1"/>
@@ -5200,11 +5180,7 @@
               <a:t> a </a:t>
             </a:r>
             <a:r>
-              <a:rPr lang="it-IT" b="1" dirty="0" err="1">
-                <a:solidFill>
-                  <a:schemeClr val="tx1"/>
-                </a:solidFill>
-              </a:rPr>
+              <a:rPr lang="it-IT" dirty="0" err="1"/>
               <a:t>mean</a:t>
             </a:r>
             <a:r>
@@ -5270,11 +5246,7 @@
               <a:t> some </a:t>
             </a:r>
             <a:r>
-              <a:rPr lang="it-IT" b="1" dirty="0" err="1">
-                <a:solidFill>
-                  <a:schemeClr val="tx1"/>
-                </a:solidFill>
-              </a:rPr>
+              <a:rPr lang="it-IT" dirty="0" err="1"/>
               <a:t>scaling</a:t>
             </a:r>
             <a:r>
@@ -5401,19 +5373,7 @@
             </a:r>
             <a:r>
               <a:rPr lang="it-IT" dirty="0"/>
-              <a:t>, like </a:t>
-            </a:r>
-            <a:r>
-              <a:rPr lang="it-IT" b="1" dirty="0">
-                <a:solidFill>
-                  <a:schemeClr val="tx1"/>
-                </a:solidFill>
-              </a:rPr>
-              <a:t>ranges</a:t>
-            </a:r>
-            <a:r>
-              <a:rPr lang="it-IT" dirty="0"/>
-              <a:t> for </a:t>
+              <a:t>, like ranges for </a:t>
             </a:r>
             <a:r>
               <a:rPr lang="it-IT" dirty="0" err="1"/>
@@ -5485,7 +5445,7 @@
           <a:p>
             <a:fld id="{21C10D9A-70FE-42B6-A997-8B15A4351D56}" type="datetime1">
               <a:rPr lang="en-US" sz="1200" smtClean="0"/>
-              <a:t>5/1/2020</a:t>
+              <a:t>5/3/2020</a:t>
             </a:fld>
             <a:endParaRPr lang="en-US" sz="1200"/>
           </a:p>
@@ -5587,19 +5547,7 @@
             </a:r>
             <a:r>
               <a:rPr lang="en-US" dirty="0"/>
-              <a:t>Earthquakes have always been considered a </a:t>
-            </a:r>
-            <a:r>
-              <a:rPr lang="en-US" b="1" dirty="0">
-                <a:solidFill>
-                  <a:schemeClr val="tx1"/>
-                </a:solidFill>
-              </a:rPr>
-              <a:t>natural disaster</a:t>
-            </a:r>
-            <a:r>
-              <a:rPr lang="en-US" dirty="0"/>
-              <a:t>, bringing destruction and devastation in cities and countries.</a:t>
+              <a:t>Earthquakes have always been considered a natural disaster, bringing destruction and devastation in cities and countries.</a:t>
             </a:r>
           </a:p>
           <a:p>
@@ -5629,43 +5577,7 @@
             </a:pPr>
             <a:r>
               <a:rPr lang="en-US" dirty="0"/>
-              <a:t> Of particular importance could be the monitoring of the various earthquakes of a specific </a:t>
-            </a:r>
-            <a:r>
-              <a:rPr lang="en-US" b="1" dirty="0">
-                <a:solidFill>
-                  <a:schemeClr val="tx1"/>
-                </a:solidFill>
-              </a:rPr>
-              <a:t>country</a:t>
-            </a:r>
-            <a:r>
-              <a:rPr lang="en-US" dirty="0"/>
-              <a:t> during the </a:t>
-            </a:r>
-            <a:r>
-              <a:rPr lang="en-US" b="1" dirty="0">
-                <a:solidFill>
-                  <a:schemeClr val="tx1"/>
-                </a:solidFill>
-              </a:rPr>
-              <a:t>years</a:t>
-            </a:r>
-            <a:r>
-              <a:rPr lang="en-US" dirty="0"/>
-              <a:t> or the </a:t>
-            </a:r>
-            <a:r>
-              <a:rPr lang="en-US" b="1" dirty="0">
-                <a:solidFill>
-                  <a:schemeClr val="tx1"/>
-                </a:solidFill>
-              </a:rPr>
-              <a:t>comparison</a:t>
-            </a:r>
-            <a:r>
-              <a:rPr lang="en-US" dirty="0"/>
-              <a:t> of two adjacent countries to see how, also between near territory the earthquake occurrences changes.</a:t>
+              <a:t> Of particular importance could be the monitoring of the various earthquakes of a specific country during the years or the comparison of two adjacent countries to see how, also between near territory the earthquake occurrences changes.</a:t>
             </a:r>
             <a:endParaRPr lang="it-IT" dirty="0"/>
           </a:p>
@@ -5826,7 +5738,7 @@
           <a:p>
             <a:fld id="{5E7E14DC-9293-49D6-9A96-949929A081AC}" type="datetime1">
               <a:rPr lang="en-US" sz="1200" smtClean="0"/>
-              <a:t>5/1/2020</a:t>
+              <a:t>5/3/2020</a:t>
             </a:fld>
             <a:endParaRPr lang="en-US" sz="1200"/>
           </a:p>
@@ -7166,7 +7078,7 @@
           <a:p>
             <a:fld id="{85AFEC11-81A4-44B4-AF55-863FAA31C847}" type="datetime1">
               <a:rPr lang="en-US" sz="1200" smtClean="0"/>
-              <a:t>5/1/2020</a:t>
+              <a:t>5/3/2020</a:t>
             </a:fld>
             <a:endParaRPr lang="en-US" sz="1200"/>
           </a:p>
@@ -7313,7 +7225,7 @@
             </a:pPr>
             <a:r>
               <a:rPr lang="en-US" dirty="0"/>
-              <a:t>Preprocessing step removed some column of dataset not useful for our purposes.</a:t>
+              <a:t>Preprocessing process removed some column of dataset not useful for our purposes.</a:t>
             </a:r>
           </a:p>
           <a:p>
@@ -7451,7 +7363,7 @@
           <a:p>
             <a:fld id="{117A1719-8E99-43BB-8926-FDF4D8CDE160}" type="datetime1">
               <a:rPr lang="en-US" sz="1200" smtClean="0"/>
-              <a:t>5/1/2020</a:t>
+              <a:t>5/3/2020</a:t>
             </a:fld>
             <a:endParaRPr lang="en-US" sz="1200"/>
           </a:p>
@@ -7590,19 +7502,7 @@
             </a:pPr>
             <a:r>
               <a:rPr lang="en-US" dirty="0"/>
-              <a:t>Starting the project, this overview appears to the users: they can </a:t>
-            </a:r>
-            <a:r>
-              <a:rPr lang="en-US" b="1" dirty="0">
-                <a:solidFill>
-                  <a:schemeClr val="tx1"/>
-                </a:solidFill>
-              </a:rPr>
-              <a:t>explore</a:t>
-            </a:r>
-            <a:r>
-              <a:rPr lang="en-US" dirty="0"/>
-              <a:t> the map, read the frequencies of earthquake through the bar, filter the parallel coordinates plot and the scatterplot to focus on particular data.</a:t>
+              <a:t>Starting the project, this overview appears to the users: they can explore the map, read the frequencies of earthquake through the bar, filter the parallel chart and the scatterplot to focus on particular data.</a:t>
             </a:r>
           </a:p>
           <a:p>
@@ -7611,75 +7511,7 @@
             </a:pPr>
             <a:r>
               <a:rPr lang="en-US" dirty="0"/>
-              <a:t>Moreover, if one wants to focus on a specific country, he can </a:t>
-            </a:r>
-            <a:r>
-              <a:rPr lang="en-US" b="1" dirty="0">
-                <a:solidFill>
-                  <a:schemeClr val="tx1"/>
-                </a:solidFill>
-              </a:rPr>
-              <a:t>select</a:t>
-            </a:r>
-            <a:r>
-              <a:rPr lang="en-US" dirty="0"/>
-              <a:t> through the map a country (or two if he wants to compare them) </a:t>
-            </a:r>
-            <a:r>
-              <a:rPr lang="en-US" b="1" dirty="0">
-                <a:solidFill>
-                  <a:schemeClr val="tx1"/>
-                </a:solidFill>
-              </a:rPr>
-              <a:t>and</a:t>
-            </a:r>
-            <a:r>
-              <a:rPr lang="en-US" b="1" dirty="0"/>
-              <a:t> </a:t>
-            </a:r>
-            <a:r>
-              <a:rPr lang="en-US" b="1" dirty="0">
-                <a:solidFill>
-                  <a:schemeClr val="tx1"/>
-                </a:solidFill>
-              </a:rPr>
-              <a:t>visualize</a:t>
-            </a:r>
-            <a:r>
-              <a:rPr lang="en-US" b="1" dirty="0"/>
-              <a:t> </a:t>
-            </a:r>
-            <a:r>
-              <a:rPr lang="en-US" dirty="0"/>
-              <a:t>more </a:t>
-            </a:r>
-            <a:r>
-              <a:rPr lang="en-US" b="1" dirty="0">
-                <a:solidFill>
-                  <a:schemeClr val="tx1"/>
-                </a:solidFill>
-              </a:rPr>
-              <a:t>detailed</a:t>
-            </a:r>
-            <a:r>
-              <a:rPr lang="en-US" b="1" dirty="0"/>
-              <a:t> </a:t>
-            </a:r>
-            <a:r>
-              <a:rPr lang="en-US" b="1" dirty="0">
-                <a:solidFill>
-                  <a:schemeClr val="tx1"/>
-                </a:solidFill>
-              </a:rPr>
-              <a:t>info</a:t>
-            </a:r>
-            <a:r>
-              <a:rPr lang="en-US" b="1" dirty="0"/>
-              <a:t> </a:t>
-            </a:r>
-            <a:r>
-              <a:rPr lang="en-US" dirty="0"/>
-              <a:t>of the features of that country.</a:t>
+              <a:t>Moreover, if one wants to focus on a specific country, he can select through the map a country (or two if he wants to compare them) and visualize more detailed info of the features of that country.</a:t>
             </a:r>
             <a:endParaRPr lang="it-IT" dirty="0"/>
           </a:p>
@@ -7758,7 +7590,7 @@
           <a:p>
             <a:fld id="{AD7CD4AD-5E8B-4BE1-9217-F4BBCAF79CE5}" type="datetime1">
               <a:rPr lang="en-US" sz="1200" smtClean="0"/>
-              <a:t>5/1/2020</a:t>
+              <a:t>5/3/2020</a:t>
             </a:fld>
             <a:endParaRPr lang="en-US" sz="1200"/>
           </a:p>
@@ -7794,10 +7626,10 @@
       </p:sp>
       <p:pic>
         <p:nvPicPr>
-          <p:cNvPr id="6" name="Immagine 5" descr="Immagine che contiene mappa&#10;&#10;Descrizione generata automaticamente">
+          <p:cNvPr id="9" name="Immagine 8" descr="Immagine che contiene screenshot, mappa&#10;&#10;Descrizione generata automaticamente">
             <a:extLst>
               <a:ext uri="{FF2B5EF4-FFF2-40B4-BE49-F238E27FC236}">
-                <a16:creationId xmlns:a16="http://schemas.microsoft.com/office/drawing/2014/main" id="{C6129532-7E45-401A-9A24-AF96D71DD8FF}"/>
+                <a16:creationId xmlns:a16="http://schemas.microsoft.com/office/drawing/2014/main" id="{761EFFD9-C84F-43E7-BAE6-1BB95F9D858D}"/>
               </a:ext>
             </a:extLst>
           </p:cNvPr>
@@ -7820,8 +7652,8 @@
         </p:blipFill>
         <p:spPr>
           <a:xfrm>
-            <a:off x="4520196" y="2135533"/>
-            <a:ext cx="7015538" cy="3944314"/>
+            <a:off x="4360743" y="2136779"/>
+            <a:ext cx="7011106" cy="3941822"/>
           </a:xfrm>
           <a:prstGeom prst="rect">
             <a:avLst/>
@@ -7858,309 +7690,12 @@
           <a:chExt cx="0" cy="0"/>
         </a:xfrm>
       </p:grpSpPr>
-      <p:sp>
-        <p:nvSpPr>
-          <p:cNvPr id="2" name="Titolo 1">
+      <p:pic>
+        <p:nvPicPr>
+          <p:cNvPr id="11" name="Immagine 10" descr="Immagine che contiene testo, mappa&#10;&#10;Descrizione generata automaticamente">
             <a:extLst>
               <a:ext uri="{FF2B5EF4-FFF2-40B4-BE49-F238E27FC236}">
-                <a16:creationId xmlns:a16="http://schemas.microsoft.com/office/drawing/2014/main" id="{310FD401-5F2D-480A-AE54-2AFE187A8039}"/>
-              </a:ext>
-            </a:extLst>
-          </p:cNvPr>
-          <p:cNvSpPr>
-            <a:spLocks noGrp="1"/>
-          </p:cNvSpPr>
-          <p:nvPr>
-            <p:ph type="title"/>
-          </p:nvPr>
-        </p:nvSpPr>
-        <p:spPr>
-          <a:xfrm>
-            <a:off x="1066800" y="132079"/>
-            <a:ext cx="10058400" cy="818792"/>
-          </a:xfrm>
-        </p:spPr>
-        <p:txBody>
-          <a:bodyPr/>
-          <a:lstStyle/>
-          <a:p>
-            <a:r>
-              <a:rPr lang="it-IT" dirty="0" err="1">
-                <a:solidFill>
-                  <a:srgbClr val="9B2D1F"/>
-                </a:solidFill>
-              </a:rPr>
-              <a:t>Map</a:t>
-            </a:r>
-            <a:r>
-              <a:rPr lang="it-IT" dirty="0">
-                <a:solidFill>
-                  <a:srgbClr val="9B2D1F"/>
-                </a:solidFill>
-              </a:rPr>
-              <a:t> and </a:t>
-            </a:r>
-            <a:r>
-              <a:rPr lang="it-IT" dirty="0" err="1">
-                <a:solidFill>
-                  <a:srgbClr val="9B2D1F"/>
-                </a:solidFill>
-              </a:rPr>
-              <a:t>parallel</a:t>
-            </a:r>
-            <a:r>
-              <a:rPr lang="it-IT" dirty="0">
-                <a:solidFill>
-                  <a:srgbClr val="9B2D1F"/>
-                </a:solidFill>
-              </a:rPr>
-              <a:t> </a:t>
-            </a:r>
-            <a:r>
-              <a:rPr lang="it-IT" dirty="0" err="1">
-                <a:solidFill>
-                  <a:srgbClr val="9B2D1F"/>
-                </a:solidFill>
-              </a:rPr>
-              <a:t>coordinates</a:t>
-            </a:r>
-            <a:r>
-              <a:rPr lang="it-IT" dirty="0">
-                <a:solidFill>
-                  <a:srgbClr val="9B2D1F"/>
-                </a:solidFill>
-              </a:rPr>
-              <a:t> plot</a:t>
-            </a:r>
-          </a:p>
-        </p:txBody>
-      </p:sp>
-      <p:sp>
-        <p:nvSpPr>
-          <p:cNvPr id="3" name="Segnaposto contenuto 2">
-            <a:extLst>
-              <a:ext uri="{FF2B5EF4-FFF2-40B4-BE49-F238E27FC236}">
-                <a16:creationId xmlns:a16="http://schemas.microsoft.com/office/drawing/2014/main" id="{6F5012F0-AE58-4D66-8C1C-5453EE74B3C5}"/>
-              </a:ext>
-            </a:extLst>
-          </p:cNvPr>
-          <p:cNvSpPr>
-            <a:spLocks noGrp="1"/>
-          </p:cNvSpPr>
-          <p:nvPr>
-            <p:ph idx="1"/>
-          </p:nvPr>
-        </p:nvSpPr>
-        <p:spPr>
-          <a:xfrm>
-            <a:off x="1066800" y="2013245"/>
-            <a:ext cx="4489938" cy="3708138"/>
-          </a:xfrm>
-        </p:spPr>
-        <p:txBody>
-          <a:bodyPr>
-            <a:noAutofit/>
-          </a:bodyPr>
-          <a:lstStyle/>
-          <a:p>
-            <a:pPr marL="0" indent="0">
-              <a:buNone/>
-            </a:pPr>
-            <a:r>
-              <a:rPr lang="en-US" dirty="0"/>
-              <a:t>Parallel </a:t>
-            </a:r>
-            <a:r>
-              <a:rPr lang="en-US" dirty="0" err="1"/>
-              <a:t>coord</a:t>
-            </a:r>
-            <a:r>
-              <a:rPr lang="en-US" dirty="0"/>
-              <a:t>. plot allows to user to </a:t>
-            </a:r>
-            <a:r>
-              <a:rPr lang="en-US" b="1" dirty="0">
-                <a:solidFill>
-                  <a:schemeClr val="tx1"/>
-                </a:solidFill>
-              </a:rPr>
-              <a:t>brush</a:t>
-            </a:r>
-            <a:r>
-              <a:rPr lang="en-US" dirty="0"/>
-              <a:t> its axes in order to select a range of values of interest.</a:t>
-            </a:r>
-          </a:p>
-          <a:p>
-            <a:pPr marL="0" indent="0">
-              <a:buNone/>
-            </a:pPr>
-            <a:r>
-              <a:rPr lang="en-US" dirty="0"/>
-              <a:t>The map responds to parallel coordinates plot changes updating the points.</a:t>
-            </a:r>
-          </a:p>
-          <a:p>
-            <a:pPr marL="0" indent="0">
-              <a:buNone/>
-            </a:pPr>
-            <a:r>
-              <a:rPr lang="en-US" dirty="0"/>
-              <a:t>This </a:t>
-            </a:r>
-            <a:r>
-              <a:rPr lang="en-US" b="1" dirty="0">
-                <a:solidFill>
-                  <a:schemeClr val="tx1"/>
-                </a:solidFill>
-              </a:rPr>
-              <a:t>interaction</a:t>
-            </a:r>
-            <a:r>
-              <a:rPr lang="en-US" dirty="0"/>
-              <a:t> enable an easy </a:t>
-            </a:r>
-            <a:r>
-              <a:rPr lang="en-US" b="1" dirty="0">
-                <a:solidFill>
-                  <a:schemeClr val="tx1"/>
-                </a:solidFill>
-              </a:rPr>
-              <a:t>filtering</a:t>
-            </a:r>
-            <a:r>
-              <a:rPr lang="en-US" dirty="0"/>
-              <a:t> of the data from any feature of the dataset.</a:t>
-            </a:r>
-          </a:p>
-          <a:p>
-            <a:pPr marL="0" indent="0">
-              <a:buNone/>
-            </a:pPr>
-            <a:br>
-              <a:rPr lang="en-US" dirty="0"/>
-            </a:br>
-            <a:r>
-              <a:rPr lang="en-US" dirty="0"/>
-              <a:t>Also the parallel filtering will influence all the other graphs of the project.</a:t>
-            </a:r>
-            <a:endParaRPr lang="it-IT" dirty="0"/>
-          </a:p>
-        </p:txBody>
-      </p:sp>
-      <p:sp>
-        <p:nvSpPr>
-          <p:cNvPr id="4" name="CasellaDiTesto 3">
-            <a:extLst>
-              <a:ext uri="{FF2B5EF4-FFF2-40B4-BE49-F238E27FC236}">
-                <a16:creationId xmlns:a16="http://schemas.microsoft.com/office/drawing/2014/main" id="{AF63FAD0-BFE6-480B-9398-327648D8E304}"/>
-              </a:ext>
-            </a:extLst>
-          </p:cNvPr>
-          <p:cNvSpPr txBox="1"/>
-          <p:nvPr/>
-        </p:nvSpPr>
-        <p:spPr>
-          <a:xfrm>
-            <a:off x="1066800" y="1109264"/>
-            <a:ext cx="10058400" cy="646331"/>
-          </a:xfrm>
-          <a:prstGeom prst="rect">
-            <a:avLst/>
-          </a:prstGeom>
-          <a:noFill/>
-        </p:spPr>
-        <p:txBody>
-          <a:bodyPr wrap="square" rtlCol="0">
-            <a:spAutoFit/>
-          </a:bodyPr>
-          <a:lstStyle/>
-          <a:p>
-            <a:r>
-              <a:rPr lang="en-US" dirty="0">
-                <a:solidFill>
-                  <a:schemeClr val="tx1">
-                    <a:lumMod val="85000"/>
-                    <a:lumOff val="15000"/>
-                  </a:schemeClr>
-                </a:solidFill>
-              </a:rPr>
-              <a:t>These graphs are two of the main visual elements of the project. They fill both the overview page and the comparison page, and through parallel filtering, the map points are updated.</a:t>
-            </a:r>
-            <a:endParaRPr lang="it-IT" dirty="0">
-              <a:solidFill>
-                <a:schemeClr val="tx1">
-                  <a:lumMod val="85000"/>
-                  <a:lumOff val="15000"/>
-                </a:schemeClr>
-              </a:solidFill>
-            </a:endParaRPr>
-          </a:p>
-        </p:txBody>
-      </p:sp>
-      <p:sp>
-        <p:nvSpPr>
-          <p:cNvPr id="8" name="Segnaposto data 7">
-            <a:extLst>
-              <a:ext uri="{FF2B5EF4-FFF2-40B4-BE49-F238E27FC236}">
-                <a16:creationId xmlns:a16="http://schemas.microsoft.com/office/drawing/2014/main" id="{CFF03DCA-208E-46A5-833A-DD1ADEC85B5B}"/>
-              </a:ext>
-            </a:extLst>
-          </p:cNvPr>
-          <p:cNvSpPr>
-            <a:spLocks noGrp="1"/>
-          </p:cNvSpPr>
-          <p:nvPr>
-            <p:ph type="dt" sz="half" idx="10"/>
-          </p:nvPr>
-        </p:nvSpPr>
-        <p:spPr/>
-        <p:txBody>
-          <a:bodyPr/>
-          <a:lstStyle/>
-          <a:p>
-            <a:fld id="{DE58C6DA-BA73-45B6-9F63-89706DBDC295}" type="datetime1">
-              <a:rPr lang="en-US" sz="1200" smtClean="0"/>
-              <a:t>5/1/2020</a:t>
-            </a:fld>
-            <a:endParaRPr lang="en-US" sz="1200"/>
-          </a:p>
-        </p:txBody>
-      </p:sp>
-      <p:sp>
-        <p:nvSpPr>
-          <p:cNvPr id="9" name="Segnaposto piè di pagina 8">
-            <a:extLst>
-              <a:ext uri="{FF2B5EF4-FFF2-40B4-BE49-F238E27FC236}">
-                <a16:creationId xmlns:a16="http://schemas.microsoft.com/office/drawing/2014/main" id="{F7B95389-9418-42D4-A033-64E988CDBAF1}"/>
-              </a:ext>
-            </a:extLst>
-          </p:cNvPr>
-          <p:cNvSpPr>
-            <a:spLocks noGrp="1"/>
-          </p:cNvSpPr>
-          <p:nvPr>
-            <p:ph type="ftr" sz="quarter" idx="11"/>
-          </p:nvPr>
-        </p:nvSpPr>
-        <p:spPr/>
-        <p:txBody>
-          <a:bodyPr/>
-          <a:lstStyle/>
-          <a:p>
-            <a:r>
-              <a:rPr lang="en-US" sz="1200"/>
-              <a:t>Visual Analytics, Sapienza University of Rome</a:t>
-            </a:r>
-          </a:p>
-        </p:txBody>
-      </p:sp>
-      <p:pic>
-        <p:nvPicPr>
-          <p:cNvPr id="6" name="Immagine 5" descr="Immagine che contiene testo, mappa&#10;&#10;Descrizione generata automaticamente">
-            <a:extLst>
-              <a:ext uri="{FF2B5EF4-FFF2-40B4-BE49-F238E27FC236}">
-                <a16:creationId xmlns:a16="http://schemas.microsoft.com/office/drawing/2014/main" id="{6B536557-9E3E-47C4-BC6C-FB4DECC392D7}"/>
+                <a16:creationId xmlns:a16="http://schemas.microsoft.com/office/drawing/2014/main" id="{6FB2B8FB-13E5-4F33-A443-C25A40B04AED}"/>
               </a:ext>
             </a:extLst>
           </p:cNvPr>
@@ -8183,8 +7718,300 @@
         </p:blipFill>
         <p:spPr>
           <a:xfrm>
+            <a:off x="6441077" y="2013245"/>
+            <a:ext cx="4141626" cy="4124224"/>
+          </a:xfrm>
+          <a:prstGeom prst="rect">
+            <a:avLst/>
+          </a:prstGeom>
+        </p:spPr>
+      </p:pic>
+      <p:sp>
+        <p:nvSpPr>
+          <p:cNvPr id="2" name="Titolo 1">
+            <a:extLst>
+              <a:ext uri="{FF2B5EF4-FFF2-40B4-BE49-F238E27FC236}">
+                <a16:creationId xmlns:a16="http://schemas.microsoft.com/office/drawing/2014/main" id="{310FD401-5F2D-480A-AE54-2AFE187A8039}"/>
+              </a:ext>
+            </a:extLst>
+          </p:cNvPr>
+          <p:cNvSpPr>
+            <a:spLocks noGrp="1"/>
+          </p:cNvSpPr>
+          <p:nvPr>
+            <p:ph type="title"/>
+          </p:nvPr>
+        </p:nvSpPr>
+        <p:spPr>
+          <a:xfrm>
+            <a:off x="1066800" y="132079"/>
+            <a:ext cx="10058400" cy="818792"/>
+          </a:xfrm>
+        </p:spPr>
+        <p:txBody>
+          <a:bodyPr/>
+          <a:lstStyle/>
+          <a:p>
+            <a:r>
+              <a:rPr lang="it-IT" dirty="0" err="1">
+                <a:solidFill>
+                  <a:srgbClr val="9B2D1F"/>
+                </a:solidFill>
+              </a:rPr>
+              <a:t>Map</a:t>
+            </a:r>
+            <a:r>
+              <a:rPr lang="it-IT" dirty="0">
+                <a:solidFill>
+                  <a:srgbClr val="9B2D1F"/>
+                </a:solidFill>
+              </a:rPr>
+              <a:t> and </a:t>
+            </a:r>
+            <a:r>
+              <a:rPr lang="it-IT" dirty="0" err="1">
+                <a:solidFill>
+                  <a:srgbClr val="9B2D1F"/>
+                </a:solidFill>
+              </a:rPr>
+              <a:t>parallel</a:t>
+            </a:r>
+            <a:r>
+              <a:rPr lang="it-IT" dirty="0">
+                <a:solidFill>
+                  <a:srgbClr val="9B2D1F"/>
+                </a:solidFill>
+              </a:rPr>
+              <a:t> </a:t>
+            </a:r>
+            <a:r>
+              <a:rPr lang="it-IT" dirty="0" err="1">
+                <a:solidFill>
+                  <a:srgbClr val="9B2D1F"/>
+                </a:solidFill>
+              </a:rPr>
+              <a:t>coordinates</a:t>
+            </a:r>
+            <a:r>
+              <a:rPr lang="it-IT" dirty="0">
+                <a:solidFill>
+                  <a:srgbClr val="9B2D1F"/>
+                </a:solidFill>
+              </a:rPr>
+              <a:t> chart</a:t>
+            </a:r>
+          </a:p>
+        </p:txBody>
+      </p:sp>
+      <p:sp>
+        <p:nvSpPr>
+          <p:cNvPr id="3" name="Segnaposto contenuto 2">
+            <a:extLst>
+              <a:ext uri="{FF2B5EF4-FFF2-40B4-BE49-F238E27FC236}">
+                <a16:creationId xmlns:a16="http://schemas.microsoft.com/office/drawing/2014/main" id="{6F5012F0-AE58-4D66-8C1C-5453EE74B3C5}"/>
+              </a:ext>
+            </a:extLst>
+          </p:cNvPr>
+          <p:cNvSpPr>
+            <a:spLocks noGrp="1"/>
+          </p:cNvSpPr>
+          <p:nvPr>
+            <p:ph idx="1"/>
+          </p:nvPr>
+        </p:nvSpPr>
+        <p:spPr>
+          <a:xfrm>
+            <a:off x="1066800" y="2013245"/>
+            <a:ext cx="4489938" cy="3708138"/>
+          </a:xfrm>
+        </p:spPr>
+        <p:txBody>
+          <a:bodyPr>
+            <a:noAutofit/>
+          </a:bodyPr>
+          <a:lstStyle/>
+          <a:p>
+            <a:pPr marL="0" indent="0">
+              <a:buNone/>
+            </a:pPr>
+            <a:r>
+              <a:rPr lang="en-US" dirty="0"/>
+              <a:t>Parallel allows to user to brush its axes in order to select a range of values of interest.</a:t>
+            </a:r>
+          </a:p>
+          <a:p>
+            <a:pPr marL="0" indent="0">
+              <a:buNone/>
+            </a:pPr>
+            <a:r>
+              <a:rPr lang="en-US" dirty="0"/>
+              <a:t>The map responds to parallel changes updating the points.</a:t>
+            </a:r>
+          </a:p>
+          <a:p>
+            <a:pPr marL="0" indent="0">
+              <a:buNone/>
+            </a:pPr>
+            <a:r>
+              <a:rPr lang="en-US" dirty="0"/>
+              <a:t>This interaction enable an easy filtering of the data from any feature of the dataset.</a:t>
+            </a:r>
+          </a:p>
+          <a:p>
+            <a:pPr marL="0" indent="0">
+              <a:buNone/>
+            </a:pPr>
+            <a:endParaRPr lang="en-US" dirty="0"/>
+          </a:p>
+          <a:p>
+            <a:pPr marL="0" indent="0">
+              <a:buNone/>
+            </a:pPr>
+            <a:r>
+              <a:rPr lang="en-US" dirty="0"/>
+              <a:t>Also the parallel filtering will influence all the other graphs of the project.</a:t>
+            </a:r>
+            <a:endParaRPr lang="it-IT" dirty="0"/>
+          </a:p>
+        </p:txBody>
+      </p:sp>
+      <p:sp>
+        <p:nvSpPr>
+          <p:cNvPr id="4" name="CasellaDiTesto 3">
+            <a:extLst>
+              <a:ext uri="{FF2B5EF4-FFF2-40B4-BE49-F238E27FC236}">
+                <a16:creationId xmlns:a16="http://schemas.microsoft.com/office/drawing/2014/main" id="{AF63FAD0-BFE6-480B-9398-327648D8E304}"/>
+              </a:ext>
+            </a:extLst>
+          </p:cNvPr>
+          <p:cNvSpPr txBox="1"/>
+          <p:nvPr/>
+        </p:nvSpPr>
+        <p:spPr>
+          <a:xfrm>
+            <a:off x="1066800" y="1109264"/>
+            <a:ext cx="10058400" cy="646331"/>
+          </a:xfrm>
+          <a:prstGeom prst="rect">
+            <a:avLst/>
+          </a:prstGeom>
+          <a:noFill/>
+        </p:spPr>
+        <p:txBody>
+          <a:bodyPr wrap="square" rtlCol="0">
+            <a:spAutoFit/>
+          </a:bodyPr>
+          <a:lstStyle/>
+          <a:p>
+            <a:r>
+              <a:rPr lang="en-US" dirty="0">
+                <a:solidFill>
+                  <a:schemeClr val="tx1">
+                    <a:lumMod val="85000"/>
+                    <a:lumOff val="15000"/>
+                  </a:schemeClr>
+                </a:solidFill>
+              </a:rPr>
+              <a:t>These graphs are two of the main visual elements of the project. They fill both the overview page and the comparison page, and through parallel filtering, the map points are updated.</a:t>
+            </a:r>
+            <a:endParaRPr lang="it-IT" dirty="0">
+              <a:solidFill>
+                <a:schemeClr val="tx1">
+                  <a:lumMod val="85000"/>
+                  <a:lumOff val="15000"/>
+                </a:schemeClr>
+              </a:solidFill>
+            </a:endParaRPr>
+          </a:p>
+        </p:txBody>
+      </p:sp>
+      <p:sp>
+        <p:nvSpPr>
+          <p:cNvPr id="8" name="Segnaposto data 7">
+            <a:extLst>
+              <a:ext uri="{FF2B5EF4-FFF2-40B4-BE49-F238E27FC236}">
+                <a16:creationId xmlns:a16="http://schemas.microsoft.com/office/drawing/2014/main" id="{CFF03DCA-208E-46A5-833A-DD1ADEC85B5B}"/>
+              </a:ext>
+            </a:extLst>
+          </p:cNvPr>
+          <p:cNvSpPr>
+            <a:spLocks noGrp="1"/>
+          </p:cNvSpPr>
+          <p:nvPr>
+            <p:ph type="dt" sz="half" idx="10"/>
+          </p:nvPr>
+        </p:nvSpPr>
+        <p:spPr/>
+        <p:txBody>
+          <a:bodyPr/>
+          <a:lstStyle/>
+          <a:p>
+            <a:fld id="{DE58C6DA-BA73-45B6-9F63-89706DBDC295}" type="datetime1">
+              <a:rPr lang="en-US" sz="1200" smtClean="0"/>
+              <a:t>5/3/2020</a:t>
+            </a:fld>
+            <a:endParaRPr lang="en-US" sz="1200"/>
+          </a:p>
+        </p:txBody>
+      </p:sp>
+      <p:sp>
+        <p:nvSpPr>
+          <p:cNvPr id="9" name="Segnaposto piè di pagina 8">
+            <a:extLst>
+              <a:ext uri="{FF2B5EF4-FFF2-40B4-BE49-F238E27FC236}">
+                <a16:creationId xmlns:a16="http://schemas.microsoft.com/office/drawing/2014/main" id="{F7B95389-9418-42D4-A033-64E988CDBAF1}"/>
+              </a:ext>
+            </a:extLst>
+          </p:cNvPr>
+          <p:cNvSpPr>
+            <a:spLocks noGrp="1"/>
+          </p:cNvSpPr>
+          <p:nvPr>
+            <p:ph type="ftr" sz="quarter" idx="11"/>
+          </p:nvPr>
+        </p:nvSpPr>
+        <p:spPr/>
+        <p:txBody>
+          <a:bodyPr/>
+          <a:lstStyle/>
+          <a:p>
+            <a:r>
+              <a:rPr lang="en-US" sz="1200"/>
+              <a:t>Visual Analytics, Sapienza University of Rome</a:t>
+            </a:r>
+          </a:p>
+        </p:txBody>
+      </p:sp>
+      <p:pic>
+        <p:nvPicPr>
+          <p:cNvPr id="7" name="Immagine 6" descr="Immagine che contiene mappa, testo&#10;&#10;Descrizione generata automaticamente">
+            <a:extLst>
+              <a:ext uri="{FF2B5EF4-FFF2-40B4-BE49-F238E27FC236}">
+                <a16:creationId xmlns:a16="http://schemas.microsoft.com/office/drawing/2014/main" id="{655A6799-B5E2-4709-BB9C-F71FFDE38C52}"/>
+              </a:ext>
+            </a:extLst>
+          </p:cNvPr>
+          <p:cNvPicPr>
+            <a:picLocks noChangeAspect="1"/>
+          </p:cNvPicPr>
+          <p:nvPr/>
+        </p:nvPicPr>
+        <p:blipFill>
+          <a:blip r:embed="rId3">
+            <a:extLst>
+              <a:ext uri="{28A0092B-C50C-407E-A947-70E740481C1C}">
+                <a14:useLocalDpi xmlns:a14="http://schemas.microsoft.com/office/drawing/2010/main" val="0"/>
+              </a:ext>
+            </a:extLst>
+          </a:blip>
+          <a:stretch>
+            <a:fillRect/>
+          </a:stretch>
+        </p:blipFill>
+        <p:spPr>
+          <a:xfrm>
             <a:off x="6441076" y="2013245"/>
-            <a:ext cx="4135825" cy="4118472"/>
+            <a:ext cx="4135825" cy="4124224"/>
           </a:xfrm>
           <a:prstGeom prst="rect">
             <a:avLst/>
@@ -8201,6 +8028,89 @@
   <p:clrMapOvr>
     <a:masterClrMapping/>
   </p:clrMapOvr>
+  <p:timing>
+    <p:tnLst>
+      <p:par>
+        <p:cTn id="1" dur="indefinite" restart="never" nodeType="tmRoot">
+          <p:childTnLst>
+            <p:seq concurrent="1" nextAc="seek">
+              <p:cTn id="2" dur="indefinite" nodeType="mainSeq">
+                <p:childTnLst>
+                  <p:par>
+                    <p:cTn id="3" fill="hold">
+                      <p:stCondLst>
+                        <p:cond delay="indefinite"/>
+                      </p:stCondLst>
+                      <p:childTnLst>
+                        <p:par>
+                          <p:cTn id="4" fill="hold">
+                            <p:stCondLst>
+                              <p:cond delay="0"/>
+                            </p:stCondLst>
+                            <p:childTnLst>
+                              <p:par>
+                                <p:cTn id="5" presetID="10" presetClass="entr" presetSubtype="0" fill="hold" nodeType="clickEffect">
+                                  <p:stCondLst>
+                                    <p:cond delay="0"/>
+                                  </p:stCondLst>
+                                  <p:childTnLst>
+                                    <p:set>
+                                      <p:cBhvr>
+                                        <p:cTn id="6" dur="1" fill="hold">
+                                          <p:stCondLst>
+                                            <p:cond delay="0"/>
+                                          </p:stCondLst>
+                                        </p:cTn>
+                                        <p:tgtEl>
+                                          <p:spTgt spid="7"/>
+                                        </p:tgtEl>
+                                        <p:attrNameLst>
+                                          <p:attrName>style.visibility</p:attrName>
+                                        </p:attrNameLst>
+                                      </p:cBhvr>
+                                      <p:to>
+                                        <p:strVal val="visible"/>
+                                      </p:to>
+                                    </p:set>
+                                    <p:animEffect transition="in" filter="fade">
+                                      <p:cBhvr>
+                                        <p:cTn id="7" dur="500"/>
+                                        <p:tgtEl>
+                                          <p:spTgt spid="7"/>
+                                        </p:tgtEl>
+                                      </p:cBhvr>
+                                    </p:animEffect>
+                                  </p:childTnLst>
+                                </p:cTn>
+                              </p:par>
+                            </p:childTnLst>
+                          </p:cTn>
+                        </p:par>
+                      </p:childTnLst>
+                    </p:cTn>
+                  </p:par>
+                </p:childTnLst>
+              </p:cTn>
+              <p:prevCondLst>
+                <p:cond evt="onPrev" delay="0">
+                  <p:tgtEl>
+                    <p:sldTgt/>
+                  </p:tgtEl>
+                </p:cond>
+              </p:prevCondLst>
+              <p:nextCondLst>
+                <p:cond evt="onNext" delay="0">
+                  <p:tgtEl>
+                    <p:sldTgt/>
+                  </p:tgtEl>
+                </p:cond>
+              </p:nextCondLst>
+            </p:seq>
+          </p:childTnLst>
+        </p:cTn>
+      </p:par>
+    </p:tnLst>
+  </p:timing>
 </p:sld>
 </file>
 
@@ -8315,38 +8225,14 @@
             </a:r>
             <a:r>
               <a:rPr lang="en-US" dirty="0"/>
-              <a:t> shows the </a:t>
-            </a:r>
-            <a:r>
-              <a:rPr lang="en-US" b="1" dirty="0">
-                <a:solidFill>
-                  <a:schemeClr val="tx1"/>
-                </a:solidFill>
-              </a:rPr>
-              <a:t>frequencies</a:t>
-            </a:r>
-            <a:r>
-              <a:rPr lang="en-US" dirty="0"/>
-              <a:t> of earthquakes in each country.</a:t>
+              <a:t> shows the frequencies of earthquakes in each country.</a:t>
             </a:r>
             <a:br>
               <a:rPr lang="en-US" dirty="0"/>
             </a:br>
             <a:r>
               <a:rPr lang="en-US" dirty="0"/>
-              <a:t>To better analyze them, the user can click on a bar to analyze </a:t>
-            </a:r>
-            <a:r>
-              <a:rPr lang="en-US" b="1" dirty="0">
-                <a:solidFill>
-                  <a:schemeClr val="tx1"/>
-                </a:solidFill>
-              </a:rPr>
-              <a:t>percentages</a:t>
-            </a:r>
-            <a:r>
-              <a:rPr lang="en-US" dirty="0"/>
-              <a:t> of each magnitude level.</a:t>
+              <a:t>To better analyze them, the user can click on a bar to analyze percentages of each magnitude level.</a:t>
             </a:r>
           </a:p>
           <a:p>
@@ -8355,19 +8241,7 @@
             </a:pPr>
             <a:r>
               <a:rPr lang="en-US" dirty="0"/>
-              <a:t>Also countries with few occurrences are grouped together creating “</a:t>
-            </a:r>
-            <a:r>
-              <a:rPr lang="en-US" b="1" dirty="0">
-                <a:solidFill>
-                  <a:schemeClr val="tx1"/>
-                </a:solidFill>
-              </a:rPr>
-              <a:t>others</a:t>
-            </a:r>
-            <a:r>
-              <a:rPr lang="en-US" dirty="0"/>
-              <a:t>” labels, and the “show all” button allows to display them.</a:t>
+              <a:t>Also countries with few occurrences are grouped together creating “others” labels, and the “show all” button allows to display them.</a:t>
             </a:r>
             <a:br>
               <a:rPr lang="en-US" dirty="0"/>
@@ -8380,74 +8254,14 @@
             </a:pPr>
             <a:r>
               <a:rPr lang="en-US" dirty="0"/>
-              <a:t>Scatterplot displays each element of the dataset according to the first two </a:t>
-            </a:r>
-            <a:r>
-              <a:rPr lang="en-US" b="1" dirty="0">
-                <a:solidFill>
-                  <a:schemeClr val="tx1"/>
-                </a:solidFill>
-              </a:rPr>
-              <a:t>PCA</a:t>
-            </a:r>
-            <a:r>
-              <a:rPr lang="en-US" b="1" dirty="0"/>
-              <a:t> </a:t>
-            </a:r>
-            <a:r>
-              <a:rPr lang="en-US" b="1" dirty="0">
-                <a:solidFill>
-                  <a:schemeClr val="tx1"/>
-                </a:solidFill>
-              </a:rPr>
-              <a:t>components</a:t>
-            </a:r>
-            <a:r>
-              <a:rPr lang="en-US" dirty="0"/>
-              <a:t>, helping to point out outliers and clusters. </a:t>
+              <a:t>Scatterplot displays each element of the dataset according to the first two PCA components, helping to point out outliers and clusters. </a:t>
             </a:r>
             <a:br>
               <a:rPr lang="en-US" dirty="0"/>
             </a:br>
             <a:r>
-              <a:rPr lang="en-US" b="1" dirty="0">
-                <a:solidFill>
-                  <a:schemeClr val="tx1"/>
-                </a:solidFill>
-              </a:rPr>
-              <a:t>Brushing</a:t>
-            </a:r>
-            <a:r>
               <a:rPr lang="en-US" dirty="0"/>
-              <a:t> a rectangle area on it will </a:t>
-            </a:r>
-            <a:r>
-              <a:rPr lang="en-US" b="1" dirty="0">
-                <a:solidFill>
-                  <a:schemeClr val="tx1"/>
-                </a:solidFill>
-              </a:rPr>
-              <a:t>point</a:t>
-            </a:r>
-            <a:r>
-              <a:rPr lang="en-US" b="1" dirty="0"/>
-              <a:t> </a:t>
-            </a:r>
-            <a:r>
-              <a:rPr lang="en-US" b="1" dirty="0">
-                <a:solidFill>
-                  <a:schemeClr val="tx1"/>
-                </a:solidFill>
-              </a:rPr>
-              <a:t>out</a:t>
-            </a:r>
-            <a:r>
-              <a:rPr lang="en-US" b="1" dirty="0"/>
-              <a:t> </a:t>
-            </a:r>
-            <a:r>
-              <a:rPr lang="en-US" dirty="0"/>
-              <a:t>the selected point both on the map and on the parallel coordinates plot, changing the data color.</a:t>
+              <a:t>Brushing a rectangle area on it will point out the selected point both on the map and on the parallel chart, changing the data color.</a:t>
             </a:r>
           </a:p>
         </p:txBody>
@@ -8525,7 +8339,7 @@
           <a:p>
             <a:fld id="{8AA3251D-E439-4AC9-B9A8-A4E255655DEA}" type="datetime1">
               <a:rPr lang="en-US" sz="1200" smtClean="0"/>
-              <a:t>5/1/2020</a:t>
+              <a:t>5/3/2020</a:t>
             </a:fld>
             <a:endParaRPr lang="en-US" sz="1200"/>
           </a:p>
@@ -8884,42 +8698,7 @@
             </a:pPr>
             <a:r>
               <a:rPr lang="en-US" dirty="0"/>
-              <a:t>We can see here that clicking on the map on a particular country, it will update parallel coordinates plot data. </a:t>
-            </a:r>
-            <a:br>
-              <a:rPr lang="en-US" dirty="0"/>
-            </a:br>
-            <a:r>
-              <a:rPr lang="en-US" dirty="0"/>
-              <a:t>So in this sense there is a </a:t>
-            </a:r>
-            <a:r>
-              <a:rPr lang="en-US" b="1" dirty="0">
-                <a:solidFill>
-                  <a:schemeClr val="tx1"/>
-                </a:solidFill>
-              </a:rPr>
-              <a:t>bidirectional</a:t>
-            </a:r>
-            <a:r>
-              <a:rPr lang="en-US" b="1" dirty="0"/>
-              <a:t> </a:t>
-            </a:r>
-            <a:r>
-              <a:rPr lang="en-US" b="1" dirty="0">
-                <a:solidFill>
-                  <a:schemeClr val="tx1"/>
-                </a:solidFill>
-              </a:rPr>
-              <a:t>interaction</a:t>
-            </a:r>
-            <a:r>
-              <a:rPr lang="en-US" b="1" dirty="0"/>
-              <a:t> </a:t>
-            </a:r>
-            <a:r>
-              <a:rPr lang="en-US" dirty="0"/>
-              <a:t>between these two graphs.</a:t>
+              <a:t>We can see here that clicking on the map on a particular country, it will update parallel data. So in this sense there is a bidirectional interaction between these two graphs.</a:t>
             </a:r>
           </a:p>
           <a:p>
@@ -8928,14 +8707,7 @@
             </a:pPr>
             <a:r>
               <a:rPr lang="en-US" dirty="0"/>
-              <a:t>Parallel coordinates plot still works as before. </a:t>
-            </a:r>
-            <a:br>
-              <a:rPr lang="en-US" dirty="0"/>
-            </a:br>
-            <a:r>
-              <a:rPr lang="en-US" dirty="0"/>
-              <a:t>Now, filtering range of data will update just the earthquakes of the selected country.</a:t>
+              <a:t>Parallel chart still works as before. Now, filtering range of data will update just the earthquakes of the selected country.</a:t>
             </a:r>
             <a:endParaRPr lang="it-IT" dirty="0"/>
           </a:p>
@@ -8964,7 +8736,7 @@
           <a:p>
             <a:fld id="{21FFF813-BE1B-43EC-A6D5-BC4E018CFF49}" type="datetime1">
               <a:rPr lang="en-US" sz="1200" smtClean="0"/>
-              <a:t>5/1/2020</a:t>
+              <a:t>5/3/2020</a:t>
             </a:fld>
             <a:endParaRPr lang="en-US" sz="1200"/>
           </a:p>
@@ -9000,10 +8772,10 @@
       </p:sp>
       <p:pic>
         <p:nvPicPr>
-          <p:cNvPr id="3" name="Immagine 2">
+          <p:cNvPr id="10" name="Immagine 9" descr="Immagine che contiene mappa, testo&#10;&#10;Descrizione generata automaticamente">
             <a:extLst>
               <a:ext uri="{FF2B5EF4-FFF2-40B4-BE49-F238E27FC236}">
-                <a16:creationId xmlns:a16="http://schemas.microsoft.com/office/drawing/2014/main" id="{E461F7EE-0D3B-49A1-99BA-3C927B9FAEF3}"/>
+                <a16:creationId xmlns:a16="http://schemas.microsoft.com/office/drawing/2014/main" id="{411E2141-87F1-4361-B5FC-762F135EB57E}"/>
               </a:ext>
             </a:extLst>
           </p:cNvPr>
@@ -9013,14 +8785,20 @@
           <p:nvPr/>
         </p:nvPicPr>
         <p:blipFill>
-          <a:blip r:embed="rId2"/>
+          <a:blip r:embed="rId2">
+            <a:extLst>
+              <a:ext uri="{28A0092B-C50C-407E-A947-70E740481C1C}">
+                <a14:useLocalDpi xmlns:a14="http://schemas.microsoft.com/office/drawing/2010/main" val="0"/>
+              </a:ext>
+            </a:extLst>
+          </a:blip>
           <a:stretch>
             <a:fillRect/>
           </a:stretch>
         </p:blipFill>
         <p:spPr>
           <a:xfrm>
-            <a:off x="4709980" y="2141936"/>
+            <a:off x="5000945" y="2141936"/>
             <a:ext cx="6415220" cy="3606800"/>
           </a:xfrm>
           <a:prstGeom prst="rect">
@@ -9030,10 +8808,10 @@
       </p:pic>
       <p:pic>
         <p:nvPicPr>
-          <p:cNvPr id="9" name="Immagine 8" descr="Immagine che contiene mappa, testo&#10;&#10;Descrizione generata automaticamente">
+          <p:cNvPr id="12" name="Immagine 11" descr="Immagine che contiene testo, mappa&#10;&#10;Descrizione generata automaticamente">
             <a:extLst>
               <a:ext uri="{FF2B5EF4-FFF2-40B4-BE49-F238E27FC236}">
-                <a16:creationId xmlns:a16="http://schemas.microsoft.com/office/drawing/2014/main" id="{2D2A08B9-9AFB-4588-89FB-7F88C5AC4A67}"/>
+                <a16:creationId xmlns:a16="http://schemas.microsoft.com/office/drawing/2014/main" id="{DA29D794-3C0E-470E-891D-CE17B8BF6A1E}"/>
               </a:ext>
             </a:extLst>
           </p:cNvPr>
@@ -9056,7 +8834,7 @@
         </p:blipFill>
         <p:spPr>
           <a:xfrm>
-            <a:off x="4709980" y="2141936"/>
+            <a:off x="5000945" y="2141937"/>
             <a:ext cx="6415220" cy="3606800"/>
           </a:xfrm>
           <a:prstGeom prst="rect">
@@ -9108,7 +8886,7 @@
                                           </p:stCondLst>
                                         </p:cTn>
                                         <p:tgtEl>
-                                          <p:spTgt spid="9"/>
+                                          <p:spTgt spid="12"/>
                                         </p:tgtEl>
                                         <p:attrNameLst>
                                           <p:attrName>style.visibility</p:attrName>
@@ -9122,7 +8900,7 @@
                                       <p:cBhvr>
                                         <p:cTn id="7" dur="500"/>
                                         <p:tgtEl>
-                                          <p:spTgt spid="9"/>
+                                          <p:spTgt spid="12"/>
                                         </p:tgtEl>
                                       </p:cBhvr>
                                     </p:animEffect>
@@ -9268,35 +9046,7 @@
             </a:r>
             <a:r>
               <a:rPr lang="en-US" dirty="0"/>
-              <a:t> shows an area for each selected country: each feature is represented by an axe and the more the area cover an axe the closer the </a:t>
-            </a:r>
-            <a:r>
-              <a:rPr lang="en-US" b="1" dirty="0">
-                <a:solidFill>
-                  <a:schemeClr val="tx1"/>
-                </a:solidFill>
-              </a:rPr>
-              <a:t>computed</a:t>
-            </a:r>
-            <a:r>
-              <a:rPr lang="en-US" b="1" dirty="0"/>
-              <a:t> </a:t>
-            </a:r>
-            <a:r>
-              <a:rPr lang="en-US" b="1" dirty="0">
-                <a:solidFill>
-                  <a:schemeClr val="tx1"/>
-                </a:solidFill>
-              </a:rPr>
-              <a:t>mean</a:t>
-            </a:r>
-            <a:r>
-              <a:rPr lang="en-US" b="1" dirty="0"/>
-              <a:t> </a:t>
-            </a:r>
-            <a:r>
-              <a:rPr lang="en-US" dirty="0"/>
-              <a:t>will be to the maximum value of that feature.</a:t>
+              <a:t> shows an area for each selected country: each feature is represented by an axe and the more the area cover an axe the closer the computed mean will be to the maximum value of that feature.</a:t>
             </a:r>
           </a:p>
           <a:p>
@@ -9319,31 +9069,7 @@
             </a:r>
             <a:r>
               <a:rPr lang="en-US" dirty="0"/>
-              <a:t> show the </a:t>
-            </a:r>
-            <a:r>
-              <a:rPr lang="en-US" b="1" dirty="0">
-                <a:solidFill>
-                  <a:schemeClr val="tx1"/>
-                </a:solidFill>
-              </a:rPr>
-              <a:t>trend</a:t>
-            </a:r>
-            <a:r>
-              <a:rPr lang="en-US" dirty="0"/>
-              <a:t> of countries’ earthquake </a:t>
-            </a:r>
-            <a:r>
-              <a:rPr lang="en-US" b="1" dirty="0">
-                <a:solidFill>
-                  <a:schemeClr val="tx1"/>
-                </a:solidFill>
-              </a:rPr>
-              <a:t>frequencies</a:t>
-            </a:r>
-            <a:r>
-              <a:rPr lang="en-US" dirty="0"/>
-              <a:t> during the selected year over each month.</a:t>
+              <a:t> show the trend of countries’ earthquake frequencies during the selected year over each month.</a:t>
             </a:r>
           </a:p>
         </p:txBody>
@@ -9421,7 +9147,7 @@
           <a:p>
             <a:fld id="{79A8EBA1-DCCF-4E06-942A-00B249EAC5DF}" type="datetime1">
               <a:rPr lang="en-US" sz="1200" smtClean="0"/>
-              <a:t>5/1/2020</a:t>
+              <a:t>5/3/2020</a:t>
             </a:fld>
             <a:endParaRPr lang="en-US" sz="1200"/>
           </a:p>

</xml_diff>

<commit_message>
uploaded the last version of docs
</commit_message>
<xml_diff>
--- a/docs/slides.pptx
+++ b/docs/slides.pptx
@@ -4636,7 +4636,7 @@
             </a:r>
             <a:r>
               <a:rPr lang="en-US" dirty="0"/>
-              <a:t>: let the user to select a year between 2000 and 2020. Also he can check button for the comparison mode.</a:t>
+              <a:t>: let the user to select a year between 2000 and 2019. Also he can check button for the comparison mode.</a:t>
             </a:r>
             <a:endParaRPr lang="en-US" b="1" dirty="0"/>
           </a:p>
@@ -4673,7 +4673,7 @@
             </a:r>
             <a:r>
               <a:rPr lang="en-US" dirty="0"/>
-              <a:t>: let the user to brush an area to focus on only part of data. Doing this, the parallel chart and the map will change their data color to point out which are the ones just selected with scatterplot.</a:t>
+              <a:t>: let the user to brush an area to focus on only part of data. Doing this, the parallel coordinates chart and the map will change their data color to point out which are the ones just selected with scatterplot.</a:t>
             </a:r>
           </a:p>
           <a:p>
@@ -4687,11 +4687,11 @@
             </a:r>
             <a:r>
               <a:rPr lang="en-US" b="1" dirty="0"/>
-              <a:t>Parallel</a:t>
+              <a:t>Parallel coordinates chart</a:t>
             </a:r>
             <a:r>
               <a:rPr lang="en-US" dirty="0"/>
-              <a:t>: it offers possibility to filter out data based on different feature of the dataset to focus on specific range of values. Doing this, all other graphs update their data according to the selected range of value. So, what emerges is also a bidirectional interaction between parallel and map and another one with parallel and scatterplot.</a:t>
+              <a:t>: it offers possibility to filter out data based on different feature of the dataset to focus on specific range of values. Doing this, all other graphs update their data according to the selected range of value. So, what emerges is also a bidirectional interaction between it and map and another one with it and scatterplot.</a:t>
             </a:r>
           </a:p>
           <a:p>
@@ -4944,19 +4944,27 @@
               <a:t> </a:t>
             </a:r>
             <a:r>
-              <a:rPr lang="it-IT" dirty="0" err="1"/>
+              <a:rPr lang="it-IT" b="1" dirty="0" err="1">
+                <a:solidFill>
+                  <a:schemeClr val="tx1"/>
+                </a:solidFill>
+              </a:rPr>
               <a:t>computation</a:t>
             </a:r>
             <a:r>
-              <a:rPr lang="it-IT" dirty="0"/>
+              <a:rPr lang="it-IT" b="1" dirty="0"/>
               <a:t> </a:t>
             </a:r>
             <a:r>
-              <a:rPr lang="it-IT" dirty="0" err="1"/>
+              <a:rPr lang="it-IT" b="1" dirty="0" err="1">
+                <a:solidFill>
+                  <a:schemeClr val="tx1"/>
+                </a:solidFill>
+              </a:rPr>
               <a:t>efforts</a:t>
             </a:r>
             <a:r>
-              <a:rPr lang="it-IT" dirty="0"/>
+              <a:rPr lang="it-IT" b="1" dirty="0"/>
               <a:t> </a:t>
             </a:r>
             <a:r>
@@ -5023,7 +5031,19 @@
             </a:r>
             <a:r>
               <a:rPr lang="it-IT" dirty="0"/>
-              <a:t> of the frequencies, </a:t>
+              <a:t> of the </a:t>
+            </a:r>
+            <a:r>
+              <a:rPr lang="it-IT" b="1" dirty="0">
+                <a:solidFill>
+                  <a:schemeClr val="tx1"/>
+                </a:solidFill>
+              </a:rPr>
+              <a:t>frequencies</a:t>
+            </a:r>
+            <a:r>
+              <a:rPr lang="it-IT" dirty="0"/>
+              <a:t>, </a:t>
             </a:r>
             <a:r>
               <a:rPr lang="it-IT" dirty="0" err="1"/>
@@ -5180,7 +5200,11 @@
               <a:t> a </a:t>
             </a:r>
             <a:r>
-              <a:rPr lang="it-IT" dirty="0" err="1"/>
+              <a:rPr lang="it-IT" b="1" dirty="0" err="1">
+                <a:solidFill>
+                  <a:schemeClr val="tx1"/>
+                </a:solidFill>
+              </a:rPr>
               <a:t>mean</a:t>
             </a:r>
             <a:r>
@@ -5246,7 +5270,11 @@
               <a:t> some </a:t>
             </a:r>
             <a:r>
-              <a:rPr lang="it-IT" dirty="0" err="1"/>
+              <a:rPr lang="it-IT" b="1" dirty="0" err="1">
+                <a:solidFill>
+                  <a:schemeClr val="tx1"/>
+                </a:solidFill>
+              </a:rPr>
               <a:t>scaling</a:t>
             </a:r>
             <a:r>
@@ -5373,7 +5401,19 @@
             </a:r>
             <a:r>
               <a:rPr lang="it-IT" dirty="0"/>
-              <a:t>, like ranges for </a:t>
+              <a:t>, like </a:t>
+            </a:r>
+            <a:r>
+              <a:rPr lang="it-IT" b="1" dirty="0">
+                <a:solidFill>
+                  <a:schemeClr val="tx1"/>
+                </a:solidFill>
+              </a:rPr>
+              <a:t>ranges</a:t>
+            </a:r>
+            <a:r>
+              <a:rPr lang="it-IT" dirty="0"/>
+              <a:t> for </a:t>
             </a:r>
             <a:r>
               <a:rPr lang="it-IT" dirty="0" err="1"/>
@@ -5547,7 +5587,19 @@
             </a:r>
             <a:r>
               <a:rPr lang="en-US" dirty="0"/>
-              <a:t>Earthquakes have always been considered a natural disaster, bringing destruction and devastation in cities and countries.</a:t>
+              <a:t>Earthquakes have always been considered a </a:t>
+            </a:r>
+            <a:r>
+              <a:rPr lang="en-US" b="1" dirty="0">
+                <a:solidFill>
+                  <a:schemeClr val="tx1"/>
+                </a:solidFill>
+              </a:rPr>
+              <a:t>natural disaster</a:t>
+            </a:r>
+            <a:r>
+              <a:rPr lang="en-US" dirty="0"/>
+              <a:t>, bringing destruction and devastation in cities and countries.</a:t>
             </a:r>
           </a:p>
           <a:p>
@@ -5577,7 +5629,43 @@
             </a:pPr>
             <a:r>
               <a:rPr lang="en-US" dirty="0"/>
-              <a:t> Of particular importance could be the monitoring of the various earthquakes of a specific country during the years or the comparison of two adjacent countries to see how, also between near territory the earthquake occurrences changes.</a:t>
+              <a:t> Of particular importance could be the monitoring of the various earthquakes of a specific </a:t>
+            </a:r>
+            <a:r>
+              <a:rPr lang="en-US" b="1" dirty="0">
+                <a:solidFill>
+                  <a:schemeClr val="tx1"/>
+                </a:solidFill>
+              </a:rPr>
+              <a:t>country</a:t>
+            </a:r>
+            <a:r>
+              <a:rPr lang="en-US" dirty="0"/>
+              <a:t> during the </a:t>
+            </a:r>
+            <a:r>
+              <a:rPr lang="en-US" b="1" dirty="0">
+                <a:solidFill>
+                  <a:schemeClr val="tx1"/>
+                </a:solidFill>
+              </a:rPr>
+              <a:t>years</a:t>
+            </a:r>
+            <a:r>
+              <a:rPr lang="en-US" dirty="0"/>
+              <a:t> or the </a:t>
+            </a:r>
+            <a:r>
+              <a:rPr lang="en-US" b="1" dirty="0">
+                <a:solidFill>
+                  <a:schemeClr val="tx1"/>
+                </a:solidFill>
+              </a:rPr>
+              <a:t>comparison</a:t>
+            </a:r>
+            <a:r>
+              <a:rPr lang="en-US" dirty="0"/>
+              <a:t> of two adjacent countries to see how, also between near territory the earthquake occurrences changes.</a:t>
             </a:r>
             <a:endParaRPr lang="it-IT" dirty="0"/>
           </a:p>
@@ -7225,7 +7313,7 @@
             </a:pPr>
             <a:r>
               <a:rPr lang="en-US" dirty="0"/>
-              <a:t>Preprocessing process removed some column of dataset not useful for our purposes.</a:t>
+              <a:t>Preprocessing step removed some column of dataset not useful for our purposes.</a:t>
             </a:r>
           </a:p>
           <a:p>
@@ -7502,7 +7590,19 @@
             </a:pPr>
             <a:r>
               <a:rPr lang="en-US" dirty="0"/>
-              <a:t>Starting the project, this overview appears to the users: they can explore the map, read the frequencies of earthquake through the bar, filter the parallel chart and the scatterplot to focus on particular data.</a:t>
+              <a:t>Starting the project, this overview appears to the users: they can </a:t>
+            </a:r>
+            <a:r>
+              <a:rPr lang="en-US" b="1" dirty="0">
+                <a:solidFill>
+                  <a:schemeClr val="tx1"/>
+                </a:solidFill>
+              </a:rPr>
+              <a:t>explore</a:t>
+            </a:r>
+            <a:r>
+              <a:rPr lang="en-US" dirty="0"/>
+              <a:t> the map, read the frequencies of earthquake through the bar, filter the parallel coordinates chart and the scatterplot to focus on particular data.</a:t>
             </a:r>
           </a:p>
           <a:p>
@@ -7511,7 +7611,75 @@
             </a:pPr>
             <a:r>
               <a:rPr lang="en-US" dirty="0"/>
-              <a:t>Moreover, if one wants to focus on a specific country, he can select through the map a country (or two if he wants to compare them) and visualize more detailed info of the features of that country.</a:t>
+              <a:t>Moreover, if one wants to focus on a specific country, he can </a:t>
+            </a:r>
+            <a:r>
+              <a:rPr lang="en-US" b="1" dirty="0">
+                <a:solidFill>
+                  <a:schemeClr val="tx1"/>
+                </a:solidFill>
+              </a:rPr>
+              <a:t>select</a:t>
+            </a:r>
+            <a:r>
+              <a:rPr lang="en-US" dirty="0"/>
+              <a:t> through the map a country (or two if he wants to compare them) </a:t>
+            </a:r>
+            <a:r>
+              <a:rPr lang="en-US" b="1" dirty="0">
+                <a:solidFill>
+                  <a:schemeClr val="tx1"/>
+                </a:solidFill>
+              </a:rPr>
+              <a:t>and</a:t>
+            </a:r>
+            <a:r>
+              <a:rPr lang="en-US" b="1" dirty="0"/>
+              <a:t> </a:t>
+            </a:r>
+            <a:r>
+              <a:rPr lang="en-US" b="1" dirty="0">
+                <a:solidFill>
+                  <a:schemeClr val="tx1"/>
+                </a:solidFill>
+              </a:rPr>
+              <a:t>visualize</a:t>
+            </a:r>
+            <a:r>
+              <a:rPr lang="en-US" b="1" dirty="0"/>
+              <a:t> </a:t>
+            </a:r>
+            <a:r>
+              <a:rPr lang="en-US" dirty="0"/>
+              <a:t>more </a:t>
+            </a:r>
+            <a:r>
+              <a:rPr lang="en-US" b="1" dirty="0">
+                <a:solidFill>
+                  <a:schemeClr val="tx1"/>
+                </a:solidFill>
+              </a:rPr>
+              <a:t>detailed</a:t>
+            </a:r>
+            <a:r>
+              <a:rPr lang="en-US" b="1" dirty="0"/>
+              <a:t> </a:t>
+            </a:r>
+            <a:r>
+              <a:rPr lang="en-US" b="1" dirty="0">
+                <a:solidFill>
+                  <a:schemeClr val="tx1"/>
+                </a:solidFill>
+              </a:rPr>
+              <a:t>info</a:t>
+            </a:r>
+            <a:r>
+              <a:rPr lang="en-US" b="1" dirty="0"/>
+              <a:t> </a:t>
+            </a:r>
+            <a:r>
+              <a:rPr lang="en-US" dirty="0"/>
+              <a:t>of the features of that country.</a:t>
             </a:r>
             <a:endParaRPr lang="it-IT" dirty="0"/>
           </a:p>
@@ -7629,7 +7797,7 @@
           <p:cNvPr id="9" name="Immagine 8" descr="Immagine che contiene screenshot, mappa&#10;&#10;Descrizione generata automaticamente">
             <a:extLst>
               <a:ext uri="{FF2B5EF4-FFF2-40B4-BE49-F238E27FC236}">
-                <a16:creationId xmlns:a16="http://schemas.microsoft.com/office/drawing/2014/main" id="{761EFFD9-C84F-43E7-BAE6-1BB95F9D858D}"/>
+                <a16:creationId xmlns:a16="http://schemas.microsoft.com/office/drawing/2014/main" id="{A32B92A6-36EF-4CDA-8D00-7D0B9E1BF531}"/>
               </a:ext>
             </a:extLst>
           </p:cNvPr>
@@ -7692,10 +7860,10 @@
       </p:grpSpPr>
       <p:pic>
         <p:nvPicPr>
-          <p:cNvPr id="11" name="Immagine 10" descr="Immagine che contiene testo, mappa&#10;&#10;Descrizione generata automaticamente">
+          <p:cNvPr id="12" name="Immagine 11" descr="Immagine che contiene testo, mappa&#10;&#10;Descrizione generata automaticamente">
             <a:extLst>
               <a:ext uri="{FF2B5EF4-FFF2-40B4-BE49-F238E27FC236}">
-                <a16:creationId xmlns:a16="http://schemas.microsoft.com/office/drawing/2014/main" id="{6FB2B8FB-13E5-4F33-A443-C25A40B04AED}"/>
+                <a16:creationId xmlns:a16="http://schemas.microsoft.com/office/drawing/2014/main" id="{57754E3B-B9E2-4101-9FA4-87CB74EDC5D9}"/>
               </a:ext>
             </a:extLst>
           </p:cNvPr>
@@ -7836,7 +8004,27 @@
             </a:pPr>
             <a:r>
               <a:rPr lang="en-US" dirty="0"/>
-              <a:t>Parallel allows to user to brush its axes in order to select a range of values of interest.</a:t>
+              <a:t>Parallel </a:t>
+            </a:r>
+            <a:r>
+              <a:rPr lang="en-US" dirty="0" err="1"/>
+              <a:t>coord</a:t>
+            </a:r>
+            <a:r>
+              <a:rPr lang="en-US" dirty="0"/>
+              <a:t>. plot allows to user to </a:t>
+            </a:r>
+            <a:r>
+              <a:rPr lang="en-US" b="1" dirty="0">
+                <a:solidFill>
+                  <a:schemeClr val="tx1"/>
+                </a:solidFill>
+              </a:rPr>
+              <a:t>brush</a:t>
+            </a:r>
+            <a:r>
+              <a:rPr lang="en-US" dirty="0"/>
+              <a:t> its axes in order to select a range of values of interest.</a:t>
             </a:r>
           </a:p>
           <a:p>
@@ -7845,7 +8033,7 @@
             </a:pPr>
             <a:r>
               <a:rPr lang="en-US" dirty="0"/>
-              <a:t>The map responds to parallel changes updating the points.</a:t>
+              <a:t>The map responds to parallel coordinates chart changes updating the points.</a:t>
             </a:r>
           </a:p>
           <a:p>
@@ -7854,19 +8042,40 @@
             </a:pPr>
             <a:r>
               <a:rPr lang="en-US" dirty="0"/>
-              <a:t>This interaction enable an easy filtering of the data from any feature of the dataset.</a:t>
+              <a:t>This </a:t>
+            </a:r>
+            <a:r>
+              <a:rPr lang="en-US" b="1" dirty="0">
+                <a:solidFill>
+                  <a:schemeClr val="tx1"/>
+                </a:solidFill>
+              </a:rPr>
+              <a:t>interaction</a:t>
+            </a:r>
+            <a:r>
+              <a:rPr lang="en-US" dirty="0"/>
+              <a:t> enable an easy </a:t>
+            </a:r>
+            <a:r>
+              <a:rPr lang="en-US" b="1" dirty="0">
+                <a:solidFill>
+                  <a:schemeClr val="tx1"/>
+                </a:solidFill>
+              </a:rPr>
+              <a:t>filtering</a:t>
+            </a:r>
+            <a:r>
+              <a:rPr lang="en-US" dirty="0"/>
+              <a:t> of the data from any feature of the dataset.</a:t>
             </a:r>
           </a:p>
           <a:p>
             <a:pPr marL="0" indent="0">
               <a:buNone/>
             </a:pPr>
-            <a:endParaRPr lang="en-US" dirty="0"/>
-          </a:p>
-          <a:p>
-            <a:pPr marL="0" indent="0">
-              <a:buNone/>
-            </a:pPr>
+            <a:br>
+              <a:rPr lang="en-US" dirty="0"/>
+            </a:br>
             <a:r>
               <a:rPr lang="en-US" dirty="0"/>
               <a:t>Also the parallel filtering will influence all the other graphs of the project.</a:t>
@@ -7984,10 +8193,10 @@
       </p:sp>
       <p:pic>
         <p:nvPicPr>
-          <p:cNvPr id="7" name="Immagine 6" descr="Immagine che contiene mappa, testo&#10;&#10;Descrizione generata automaticamente">
+          <p:cNvPr id="11" name="Immagine 10" descr="Immagine che contiene mappa, testo&#10;&#10;Descrizione generata automaticamente">
             <a:extLst>
               <a:ext uri="{FF2B5EF4-FFF2-40B4-BE49-F238E27FC236}">
-                <a16:creationId xmlns:a16="http://schemas.microsoft.com/office/drawing/2014/main" id="{655A6799-B5E2-4709-BB9C-F71FFDE38C52}"/>
+                <a16:creationId xmlns:a16="http://schemas.microsoft.com/office/drawing/2014/main" id="{DA7FB4D9-12AA-41B7-940E-13DDDFC9E17E}"/>
               </a:ext>
             </a:extLst>
           </p:cNvPr>
@@ -8062,7 +8271,7 @@
                                           </p:stCondLst>
                                         </p:cTn>
                                         <p:tgtEl>
-                                          <p:spTgt spid="7"/>
+                                          <p:spTgt spid="11"/>
                                         </p:tgtEl>
                                         <p:attrNameLst>
                                           <p:attrName>style.visibility</p:attrName>
@@ -8076,7 +8285,7 @@
                                       <p:cBhvr>
                                         <p:cTn id="7" dur="500"/>
                                         <p:tgtEl>
-                                          <p:spTgt spid="7"/>
+                                          <p:spTgt spid="11"/>
                                         </p:tgtEl>
                                       </p:cBhvr>
                                     </p:animEffect>
@@ -8225,14 +8434,38 @@
             </a:r>
             <a:r>
               <a:rPr lang="en-US" dirty="0"/>
-              <a:t> shows the frequencies of earthquakes in each country.</a:t>
+              <a:t> shows the </a:t>
+            </a:r>
+            <a:r>
+              <a:rPr lang="en-US" b="1" dirty="0">
+                <a:solidFill>
+                  <a:schemeClr val="tx1"/>
+                </a:solidFill>
+              </a:rPr>
+              <a:t>frequencies</a:t>
+            </a:r>
+            <a:r>
+              <a:rPr lang="en-US" dirty="0"/>
+              <a:t> of earthquakes in each country.</a:t>
             </a:r>
             <a:br>
               <a:rPr lang="en-US" dirty="0"/>
             </a:br>
             <a:r>
               <a:rPr lang="en-US" dirty="0"/>
-              <a:t>To better analyze them, the user can click on a bar to analyze percentages of each magnitude level.</a:t>
+              <a:t>To better analyze them, the user can click on a bar to analyze </a:t>
+            </a:r>
+            <a:r>
+              <a:rPr lang="en-US" b="1" dirty="0">
+                <a:solidFill>
+                  <a:schemeClr val="tx1"/>
+                </a:solidFill>
+              </a:rPr>
+              <a:t>percentages</a:t>
+            </a:r>
+            <a:r>
+              <a:rPr lang="en-US" dirty="0"/>
+              <a:t> of each magnitude level.</a:t>
             </a:r>
           </a:p>
           <a:p>
@@ -8241,7 +8474,19 @@
             </a:pPr>
             <a:r>
               <a:rPr lang="en-US" dirty="0"/>
-              <a:t>Also countries with few occurrences are grouped together creating “others” labels, and the “show all” button allows to display them.</a:t>
+              <a:t>Also countries with few occurrences are grouped together creating “</a:t>
+            </a:r>
+            <a:r>
+              <a:rPr lang="en-US" b="1" dirty="0">
+                <a:solidFill>
+                  <a:schemeClr val="tx1"/>
+                </a:solidFill>
+              </a:rPr>
+              <a:t>others</a:t>
+            </a:r>
+            <a:r>
+              <a:rPr lang="en-US" dirty="0"/>
+              <a:t>” labels, and the “show all” button allows to display them.</a:t>
             </a:r>
             <a:br>
               <a:rPr lang="en-US" dirty="0"/>
@@ -8254,14 +8499,74 @@
             </a:pPr>
             <a:r>
               <a:rPr lang="en-US" dirty="0"/>
-              <a:t>Scatterplot displays each element of the dataset according to the first two PCA components, helping to point out outliers and clusters. </a:t>
+              <a:t>Scatterplot displays each element of the dataset according to the first two </a:t>
+            </a:r>
+            <a:r>
+              <a:rPr lang="en-US" b="1" dirty="0">
+                <a:solidFill>
+                  <a:schemeClr val="tx1"/>
+                </a:solidFill>
+              </a:rPr>
+              <a:t>PCA</a:t>
+            </a:r>
+            <a:r>
+              <a:rPr lang="en-US" b="1" dirty="0"/>
+              <a:t> </a:t>
+            </a:r>
+            <a:r>
+              <a:rPr lang="en-US" b="1" dirty="0">
+                <a:solidFill>
+                  <a:schemeClr val="tx1"/>
+                </a:solidFill>
+              </a:rPr>
+              <a:t>components</a:t>
+            </a:r>
+            <a:r>
+              <a:rPr lang="en-US" dirty="0"/>
+              <a:t>, helping to point out outliers and clusters. </a:t>
             </a:r>
             <a:br>
               <a:rPr lang="en-US" dirty="0"/>
             </a:br>
             <a:r>
+              <a:rPr lang="en-US" b="1" dirty="0">
+                <a:solidFill>
+                  <a:schemeClr val="tx1"/>
+                </a:solidFill>
+              </a:rPr>
+              <a:t>Brushing</a:t>
+            </a:r>
+            <a:r>
               <a:rPr lang="en-US" dirty="0"/>
-              <a:t>Brushing a rectangle area on it will point out the selected point both on the map and on the parallel chart, changing the data color.</a:t>
+              <a:t> a rectangle area on it will </a:t>
+            </a:r>
+            <a:r>
+              <a:rPr lang="en-US" b="1" dirty="0">
+                <a:solidFill>
+                  <a:schemeClr val="tx1"/>
+                </a:solidFill>
+              </a:rPr>
+              <a:t>point</a:t>
+            </a:r>
+            <a:r>
+              <a:rPr lang="en-US" b="1" dirty="0"/>
+              <a:t> </a:t>
+            </a:r>
+            <a:r>
+              <a:rPr lang="en-US" b="1" dirty="0">
+                <a:solidFill>
+                  <a:schemeClr val="tx1"/>
+                </a:solidFill>
+              </a:rPr>
+              <a:t>out</a:t>
+            </a:r>
+            <a:r>
+              <a:rPr lang="en-US" b="1" dirty="0"/>
+              <a:t> </a:t>
+            </a:r>
+            <a:r>
+              <a:rPr lang="en-US" dirty="0"/>
+              <a:t>the selected point both on the map and on the parallel coordinates chart, changing the data color.</a:t>
             </a:r>
           </a:p>
         </p:txBody>
@@ -8698,7 +9003,42 @@
             </a:pPr>
             <a:r>
               <a:rPr lang="en-US" dirty="0"/>
-              <a:t>We can see here that clicking on the map on a particular country, it will update parallel data. So in this sense there is a bidirectional interaction between these two graphs.</a:t>
+              <a:t>We can see here that clicking on the map on a particular country, it will update parallel coordinates chart data. </a:t>
+            </a:r>
+            <a:br>
+              <a:rPr lang="en-US" dirty="0"/>
+            </a:br>
+            <a:r>
+              <a:rPr lang="en-US" dirty="0"/>
+              <a:t>So in this sense there is a </a:t>
+            </a:r>
+            <a:r>
+              <a:rPr lang="en-US" b="1" dirty="0">
+                <a:solidFill>
+                  <a:schemeClr val="tx1"/>
+                </a:solidFill>
+              </a:rPr>
+              <a:t>bidirectional</a:t>
+            </a:r>
+            <a:r>
+              <a:rPr lang="en-US" b="1" dirty="0"/>
+              <a:t> </a:t>
+            </a:r>
+            <a:r>
+              <a:rPr lang="en-US" b="1" dirty="0">
+                <a:solidFill>
+                  <a:schemeClr val="tx1"/>
+                </a:solidFill>
+              </a:rPr>
+              <a:t>interaction</a:t>
+            </a:r>
+            <a:r>
+              <a:rPr lang="en-US" b="1" dirty="0"/>
+              <a:t> </a:t>
+            </a:r>
+            <a:r>
+              <a:rPr lang="en-US" dirty="0"/>
+              <a:t>between these two graphs.</a:t>
             </a:r>
           </a:p>
           <a:p>
@@ -8707,7 +9047,14 @@
             </a:pPr>
             <a:r>
               <a:rPr lang="en-US" dirty="0"/>
-              <a:t>Parallel chart still works as before. Now, filtering range of data will update just the earthquakes of the selected country.</a:t>
+              <a:t>Parallel coordinates chart still works as before. </a:t>
+            </a:r>
+            <a:br>
+              <a:rPr lang="en-US" dirty="0"/>
+            </a:br>
+            <a:r>
+              <a:rPr lang="en-US" dirty="0"/>
+              <a:t>Now, filtering range of data will update just the earthquakes of the selected country.</a:t>
             </a:r>
             <a:endParaRPr lang="it-IT" dirty="0"/>
           </a:p>
@@ -8775,7 +9122,7 @@
           <p:cNvPr id="10" name="Immagine 9" descr="Immagine che contiene mappa, testo&#10;&#10;Descrizione generata automaticamente">
             <a:extLst>
               <a:ext uri="{FF2B5EF4-FFF2-40B4-BE49-F238E27FC236}">
-                <a16:creationId xmlns:a16="http://schemas.microsoft.com/office/drawing/2014/main" id="{411E2141-87F1-4361-B5FC-762F135EB57E}"/>
+                <a16:creationId xmlns:a16="http://schemas.microsoft.com/office/drawing/2014/main" id="{F1956BF4-1583-4EAC-92D5-4E86063CBE7F}"/>
               </a:ext>
             </a:extLst>
           </p:cNvPr>
@@ -8808,10 +9155,10 @@
       </p:pic>
       <p:pic>
         <p:nvPicPr>
-          <p:cNvPr id="12" name="Immagine 11" descr="Immagine che contiene testo, mappa&#10;&#10;Descrizione generata automaticamente">
+          <p:cNvPr id="11" name="Immagine 10" descr="Immagine che contiene testo, mappa&#10;&#10;Descrizione generata automaticamente">
             <a:extLst>
               <a:ext uri="{FF2B5EF4-FFF2-40B4-BE49-F238E27FC236}">
-                <a16:creationId xmlns:a16="http://schemas.microsoft.com/office/drawing/2014/main" id="{DA29D794-3C0E-470E-891D-CE17B8BF6A1E}"/>
+                <a16:creationId xmlns:a16="http://schemas.microsoft.com/office/drawing/2014/main" id="{4BB541B3-78F8-4DCA-B462-D26C33E2F34F}"/>
               </a:ext>
             </a:extLst>
           </p:cNvPr>
@@ -8886,7 +9233,7 @@
                                           </p:stCondLst>
                                         </p:cTn>
                                         <p:tgtEl>
-                                          <p:spTgt spid="12"/>
+                                          <p:spTgt spid="11"/>
                                         </p:tgtEl>
                                         <p:attrNameLst>
                                           <p:attrName>style.visibility</p:attrName>
@@ -8900,7 +9247,7 @@
                                       <p:cBhvr>
                                         <p:cTn id="7" dur="500"/>
                                         <p:tgtEl>
-                                          <p:spTgt spid="12"/>
+                                          <p:spTgt spid="11"/>
                                         </p:tgtEl>
                                       </p:cBhvr>
                                     </p:animEffect>
@@ -9046,7 +9393,35 @@
             </a:r>
             <a:r>
               <a:rPr lang="en-US" dirty="0"/>
-              <a:t> shows an area for each selected country: each feature is represented by an axe and the more the area cover an axe the closer the computed mean will be to the maximum value of that feature.</a:t>
+              <a:t> shows an area for each selected country: each feature is represented by an axe and the more the area cover an axe the closer the </a:t>
+            </a:r>
+            <a:r>
+              <a:rPr lang="en-US" b="1" dirty="0">
+                <a:solidFill>
+                  <a:schemeClr val="tx1"/>
+                </a:solidFill>
+              </a:rPr>
+              <a:t>computed</a:t>
+            </a:r>
+            <a:r>
+              <a:rPr lang="en-US" b="1" dirty="0"/>
+              <a:t> </a:t>
+            </a:r>
+            <a:r>
+              <a:rPr lang="en-US" b="1" dirty="0">
+                <a:solidFill>
+                  <a:schemeClr val="tx1"/>
+                </a:solidFill>
+              </a:rPr>
+              <a:t>mean</a:t>
+            </a:r>
+            <a:r>
+              <a:rPr lang="en-US" b="1" dirty="0"/>
+              <a:t> </a:t>
+            </a:r>
+            <a:r>
+              <a:rPr lang="en-US" dirty="0"/>
+              <a:t>will be to the maximum value of that feature.</a:t>
             </a:r>
           </a:p>
           <a:p>
@@ -9069,7 +9444,31 @@
             </a:r>
             <a:r>
               <a:rPr lang="en-US" dirty="0"/>
-              <a:t> show the trend of countries’ earthquake frequencies during the selected year over each month.</a:t>
+              <a:t> show the </a:t>
+            </a:r>
+            <a:r>
+              <a:rPr lang="en-US" b="1" dirty="0">
+                <a:solidFill>
+                  <a:schemeClr val="tx1"/>
+                </a:solidFill>
+              </a:rPr>
+              <a:t>trend</a:t>
+            </a:r>
+            <a:r>
+              <a:rPr lang="en-US" dirty="0"/>
+              <a:t> of countries’ earthquake </a:t>
+            </a:r>
+            <a:r>
+              <a:rPr lang="en-US" b="1" dirty="0">
+                <a:solidFill>
+                  <a:schemeClr val="tx1"/>
+                </a:solidFill>
+              </a:rPr>
+              <a:t>frequencies</a:t>
+            </a:r>
+            <a:r>
+              <a:rPr lang="en-US" dirty="0"/>
+              <a:t> during the selected year over each month.</a:t>
             </a:r>
           </a:p>
         </p:txBody>

</xml_diff>